<commit_message>
added some code for session-3
</commit_message>
<xml_diff>
--- a/session-2/session-2.pptx
+++ b/session-2/session-2.pptx
@@ -6662,7 +6662,7 @@
           <a:p>
             <a:r>
               <a:rPr lang="sv-SE" dirty="0"/>
-              <a:t>Image is: ocp-docker-virtual.repo-tos.intern.folksam.se/</a:t>
+              <a:t>Image is: </a:t>
             </a:r>
             <a:r>
               <a:rPr lang="sv-SE" dirty="0" err="1"/>
@@ -11770,7 +11770,7 @@
             </a:r>
             <a:r>
               <a:rPr lang="sv-SE" dirty="0" err="1"/>
-              <a:t>oc-run</a:t>
+              <a:t>kubectl-run</a:t>
             </a:r>
             <a:r>
               <a:rPr lang="sv-SE" dirty="0"/>

</xml_diff>